<commit_message>
Day two slides updated
</commit_message>
<xml_diff>
--- a/slides/Day_2.pptx
+++ b/slides/Day_2.pptx
@@ -14,6 +14,9 @@
     <p:sldId id="271" r:id="rId8"/>
     <p:sldId id="267" r:id="rId9"/>
     <p:sldId id="266" r:id="rId10"/>
+    <p:sldId id="273" r:id="rId11"/>
+    <p:sldId id="274" r:id="rId12"/>
+    <p:sldId id="272" r:id="rId13"/>
   </p:sldIdLst>
   <p:sldSz cx="9939338" cy="7451725"/>
   <p:notesSz cx="6858000" cy="9144000"/>
@@ -1587,6 +1590,534 @@
 </p:sld>
 </file>
 
+<file path=ppt/slides/slide10.xml><?xml version="1.0" encoding="utf-8"?>
+<p:sld xmlns:a="http://schemas.openxmlformats.org/drawingml/2006/main" xmlns:r="http://schemas.openxmlformats.org/officeDocument/2006/relationships" xmlns:p="http://schemas.openxmlformats.org/presentationml/2006/main">
+  <p:cSld>
+    <p:spTree>
+      <p:nvGrpSpPr>
+        <p:cNvPr id="1" name=""/>
+        <p:cNvGrpSpPr/>
+        <p:nvPr/>
+      </p:nvGrpSpPr>
+      <p:grpSpPr>
+        <a:xfrm>
+          <a:off x="0" y="0"/>
+          <a:ext cx="0" cy="0"/>
+          <a:chOff x="0" y="0"/>
+          <a:chExt cx="0" cy="0"/>
+        </a:xfrm>
+      </p:grpSpPr>
+      <p:sp>
+        <p:nvSpPr>
+          <p:cNvPr id="2" name="Text Placeholder 1"/>
+          <p:cNvSpPr>
+            <a:spLocks noGrp="1"/>
+          </p:cNvSpPr>
+          <p:nvPr>
+            <p:ph type="body" sz="quarter" idx="10"/>
+          </p:nvPr>
+        </p:nvSpPr>
+        <p:spPr/>
+        <p:txBody>
+          <a:bodyPr/>
+          <a:lstStyle/>
+          <a:p>
+            <a:r>
+              <a:rPr lang="en-US" dirty="0" smtClean="0"/>
+              <a:t>Special directory “names”</a:t>
+            </a:r>
+            <a:endParaRPr lang="en-US" dirty="0"/>
+          </a:p>
+        </p:txBody>
+      </p:sp>
+      <p:sp>
+        <p:nvSpPr>
+          <p:cNvPr id="3" name="Text Placeholder 2"/>
+          <p:cNvSpPr>
+            <a:spLocks noGrp="1"/>
+          </p:cNvSpPr>
+          <p:nvPr>
+            <p:ph type="body" sz="quarter" idx="11"/>
+          </p:nvPr>
+        </p:nvSpPr>
+        <p:spPr/>
+        <p:txBody>
+          <a:bodyPr/>
+          <a:lstStyle/>
+          <a:p>
+            <a:r>
+              <a:rPr lang="en-US" dirty="0" smtClean="0"/>
+              <a:t>If you are logged in as user </a:t>
+            </a:r>
+            <a:r>
+              <a:rPr lang="en-US" dirty="0" err="1" smtClean="0"/>
+              <a:t>ralf</a:t>
+            </a:r>
+            <a:r>
+              <a:rPr lang="en-US" dirty="0" smtClean="0"/>
+              <a:t>, </a:t>
+            </a:r>
+          </a:p>
+          <a:p>
+            <a:pPr marL="496885" lvl="1" indent="0">
+              <a:buNone/>
+            </a:pPr>
+            <a:r>
+              <a:rPr lang="da-DK" dirty="0" smtClean="0"/>
+              <a:t>~ is short for /</a:t>
+            </a:r>
+            <a:r>
+              <a:rPr lang="da-DK" dirty="0" err="1" smtClean="0"/>
+              <a:t>home</a:t>
+            </a:r>
+            <a:r>
+              <a:rPr lang="da-DK" dirty="0" smtClean="0"/>
+              <a:t>/</a:t>
+            </a:r>
+            <a:r>
+              <a:rPr lang="da-DK" dirty="0" err="1" smtClean="0"/>
+              <a:t>ralf</a:t>
+            </a:r>
+            <a:endParaRPr lang="da-DK" dirty="0" smtClean="0"/>
+          </a:p>
+          <a:p>
+            <a:r>
+              <a:rPr lang="da-DK" dirty="0" smtClean="0"/>
+              <a:t>~</a:t>
+            </a:r>
+            <a:r>
+              <a:rPr lang="da-DK" dirty="0" err="1" smtClean="0"/>
+              <a:t>joe</a:t>
+            </a:r>
+            <a:r>
+              <a:rPr lang="da-DK" dirty="0" smtClean="0"/>
+              <a:t> is short for /</a:t>
+            </a:r>
+            <a:r>
+              <a:rPr lang="da-DK" dirty="0" err="1" smtClean="0"/>
+              <a:t>home</a:t>
+            </a:r>
+            <a:r>
+              <a:rPr lang="da-DK" dirty="0" smtClean="0"/>
+              <a:t>/</a:t>
+            </a:r>
+            <a:r>
+              <a:rPr lang="da-DK" dirty="0" err="1" smtClean="0"/>
+              <a:t>joe</a:t>
+            </a:r>
+            <a:endParaRPr lang="da-DK" dirty="0" smtClean="0"/>
+          </a:p>
+          <a:p>
+            <a:r>
+              <a:rPr lang="da-DK" dirty="0" smtClean="0"/>
+              <a:t>.. is short for the folder </a:t>
+            </a:r>
+            <a:r>
+              <a:rPr lang="da-DK" dirty="0" err="1" smtClean="0"/>
+              <a:t>above</a:t>
+            </a:r>
+            <a:r>
+              <a:rPr lang="da-DK" dirty="0" smtClean="0"/>
+              <a:t> </a:t>
+            </a:r>
+            <a:r>
+              <a:rPr lang="da-DK" dirty="0" err="1" smtClean="0"/>
+              <a:t>current</a:t>
+            </a:r>
+            <a:r>
+              <a:rPr lang="da-DK" dirty="0" smtClean="0"/>
+              <a:t> </a:t>
+            </a:r>
+            <a:r>
+              <a:rPr lang="da-DK" dirty="0" err="1" smtClean="0"/>
+              <a:t>directory</a:t>
+            </a:r>
+            <a:endParaRPr lang="en-US" dirty="0" smtClean="0"/>
+          </a:p>
+          <a:p>
+            <a:r>
+              <a:rPr lang="en-US" dirty="0" smtClean="0"/>
+              <a:t>. is the current directory</a:t>
+            </a:r>
+          </a:p>
+          <a:p>
+            <a:endParaRPr lang="en-US" dirty="0"/>
+          </a:p>
+          <a:p>
+            <a:r>
+              <a:rPr lang="en-US" dirty="0" smtClean="0"/>
+              <a:t>If a filename (or directory name) starts with . it is not shown by ls.</a:t>
+            </a:r>
+          </a:p>
+          <a:p>
+            <a:r>
+              <a:rPr lang="en-US" dirty="0" smtClean="0"/>
+              <a:t>To see files starting with </a:t>
+            </a:r>
+            <a:r>
+              <a:rPr lang="da-DK" dirty="0" smtClean="0"/>
+              <a:t>. </a:t>
+            </a:r>
+            <a:r>
+              <a:rPr lang="da-DK" dirty="0" err="1" smtClean="0"/>
+              <a:t>use</a:t>
+            </a:r>
+            <a:r>
+              <a:rPr lang="da-DK" dirty="0" smtClean="0"/>
+              <a:t> the </a:t>
+            </a:r>
+            <a:r>
+              <a:rPr lang="mr-IN" dirty="0" smtClean="0"/>
+              <a:t>–</a:t>
+            </a:r>
+            <a:r>
+              <a:rPr lang="da-DK" dirty="0" smtClean="0"/>
+              <a:t>a switch </a:t>
+            </a:r>
+          </a:p>
+        </p:txBody>
+      </p:sp>
+    </p:spTree>
+    <p:extLst>
+      <p:ext uri="{BB962C8B-B14F-4D97-AF65-F5344CB8AC3E}">
+        <p14:creationId xmlns:p14="http://schemas.microsoft.com/office/powerpoint/2010/main" val="528916030"/>
+      </p:ext>
+    </p:extLst>
+  </p:cSld>
+  <p:clrMapOvr>
+    <a:masterClrMapping/>
+  </p:clrMapOvr>
+  <p:timing>
+    <p:tnLst>
+      <p:par>
+        <p:cTn id="1" dur="indefinite" restart="never" nodeType="tmRoot"/>
+      </p:par>
+    </p:tnLst>
+  </p:timing>
+</p:sld>
+</file>
+
+<file path=ppt/slides/slide11.xml><?xml version="1.0" encoding="utf-8"?>
+<p:sld xmlns:a="http://schemas.openxmlformats.org/drawingml/2006/main" xmlns:r="http://schemas.openxmlformats.org/officeDocument/2006/relationships" xmlns:p="http://schemas.openxmlformats.org/presentationml/2006/main">
+  <p:cSld>
+    <p:spTree>
+      <p:nvGrpSpPr>
+        <p:cNvPr id="1" name=""/>
+        <p:cNvGrpSpPr/>
+        <p:nvPr/>
+      </p:nvGrpSpPr>
+      <p:grpSpPr>
+        <a:xfrm>
+          <a:off x="0" y="0"/>
+          <a:ext cx="0" cy="0"/>
+          <a:chOff x="0" y="0"/>
+          <a:chExt cx="0" cy="0"/>
+        </a:xfrm>
+      </p:grpSpPr>
+      <p:sp>
+        <p:nvSpPr>
+          <p:cNvPr id="2" name="Text Placeholder 1"/>
+          <p:cNvSpPr>
+            <a:spLocks noGrp="1"/>
+          </p:cNvSpPr>
+          <p:nvPr>
+            <p:ph type="body" sz="quarter" idx="10"/>
+          </p:nvPr>
+        </p:nvSpPr>
+        <p:spPr/>
+        <p:txBody>
+          <a:bodyPr/>
+          <a:lstStyle/>
+          <a:p>
+            <a:r>
+              <a:rPr lang="en-US" dirty="0" smtClean="0"/>
+              <a:t>Redirecting output</a:t>
+            </a:r>
+            <a:endParaRPr lang="en-US" dirty="0"/>
+          </a:p>
+        </p:txBody>
+      </p:sp>
+      <p:sp>
+        <p:nvSpPr>
+          <p:cNvPr id="3" name="Text Placeholder 2"/>
+          <p:cNvSpPr>
+            <a:spLocks noGrp="1"/>
+          </p:cNvSpPr>
+          <p:nvPr>
+            <p:ph type="body" sz="quarter" idx="11"/>
+          </p:nvPr>
+        </p:nvSpPr>
+        <p:spPr/>
+        <p:txBody>
+          <a:bodyPr/>
+          <a:lstStyle/>
+          <a:p>
+            <a:r>
+              <a:rPr lang="en-US" dirty="0" smtClean="0"/>
+              <a:t>Many commands produce output to the terminal</a:t>
+            </a:r>
+          </a:p>
+          <a:p>
+            <a:r>
+              <a:rPr lang="en-US" dirty="0" smtClean="0"/>
+              <a:t>This </a:t>
+            </a:r>
+            <a:r>
+              <a:rPr lang="en-US" b="1" dirty="0" smtClean="0"/>
+              <a:t>output can be redirected</a:t>
+            </a:r>
+            <a:endParaRPr lang="en-US" dirty="0" smtClean="0"/>
+          </a:p>
+          <a:p>
+            <a:r>
+              <a:rPr lang="en-US" dirty="0" err="1" smtClean="0"/>
+              <a:t>Eg</a:t>
+            </a:r>
+            <a:r>
+              <a:rPr lang="en-US" dirty="0" smtClean="0"/>
+              <a:t>. ls </a:t>
+            </a:r>
+            <a:r>
+              <a:rPr lang="mr-IN" dirty="0" smtClean="0"/>
+              <a:t>–</a:t>
+            </a:r>
+            <a:r>
+              <a:rPr lang="en-US" dirty="0" smtClean="0"/>
+              <a:t>al &gt; </a:t>
+            </a:r>
+            <a:r>
+              <a:rPr lang="en-US" dirty="0" err="1" smtClean="0"/>
+              <a:t>myfile.txt</a:t>
+            </a:r>
+            <a:endParaRPr lang="en-US" dirty="0" smtClean="0"/>
+          </a:p>
+          <a:p>
+            <a:endParaRPr lang="en-US" dirty="0"/>
+          </a:p>
+          <a:p>
+            <a:r>
+              <a:rPr lang="en-US" dirty="0" smtClean="0"/>
+              <a:t>some files read from the terminal</a:t>
+            </a:r>
+          </a:p>
+          <a:p>
+            <a:r>
+              <a:rPr lang="en-US" dirty="0" smtClean="0"/>
+              <a:t>this </a:t>
+            </a:r>
+            <a:r>
+              <a:rPr lang="en-US" b="1" dirty="0" smtClean="0"/>
+              <a:t>input can be redirected</a:t>
+            </a:r>
+            <a:r>
+              <a:rPr lang="en-US" dirty="0" smtClean="0"/>
+              <a:t> </a:t>
+            </a:r>
+          </a:p>
+          <a:p>
+            <a:r>
+              <a:rPr lang="en-US" dirty="0" err="1" smtClean="0"/>
+              <a:t>Eg</a:t>
+            </a:r>
+            <a:r>
+              <a:rPr lang="en-US" dirty="0" smtClean="0"/>
+              <a:t>. </a:t>
+            </a:r>
+            <a:r>
+              <a:rPr lang="en-US" dirty="0" err="1" smtClean="0"/>
+              <a:t>wc</a:t>
+            </a:r>
+            <a:r>
+              <a:rPr lang="en-US" dirty="0" smtClean="0"/>
+              <a:t> &lt; </a:t>
+            </a:r>
+            <a:r>
+              <a:rPr lang="en-US" dirty="0" err="1" smtClean="0"/>
+              <a:t>myfile</a:t>
+            </a:r>
+            <a:endParaRPr lang="en-US" dirty="0" smtClean="0"/>
+          </a:p>
+          <a:p>
+            <a:endParaRPr lang="en-US" dirty="0"/>
+          </a:p>
+          <a:p>
+            <a:r>
+              <a:rPr lang="en-US" dirty="0" smtClean="0"/>
+              <a:t>output from one command can be given as input to an other </a:t>
+            </a:r>
+            <a:r>
+              <a:rPr lang="mr-IN" dirty="0" smtClean="0"/>
+              <a:t>–</a:t>
+            </a:r>
+            <a:r>
+              <a:rPr lang="en-US" dirty="0" smtClean="0"/>
+              <a:t> this is called “</a:t>
+            </a:r>
+            <a:r>
+              <a:rPr lang="en-US" b="1" dirty="0" smtClean="0"/>
+              <a:t>piping</a:t>
+            </a:r>
+            <a:r>
+              <a:rPr lang="en-US" dirty="0" smtClean="0"/>
+              <a:t>”</a:t>
+            </a:r>
+          </a:p>
+          <a:p>
+            <a:r>
+              <a:rPr lang="en-US" dirty="0" err="1" smtClean="0"/>
+              <a:t>Eg</a:t>
+            </a:r>
+            <a:r>
+              <a:rPr lang="en-US" dirty="0" smtClean="0"/>
+              <a:t>. ls—al | </a:t>
+            </a:r>
+            <a:r>
+              <a:rPr lang="en-US" dirty="0" err="1" smtClean="0"/>
+              <a:t>wc</a:t>
+            </a:r>
+            <a:r>
+              <a:rPr lang="en-US" dirty="0" smtClean="0"/>
+              <a:t> -w</a:t>
+            </a:r>
+          </a:p>
+          <a:p>
+            <a:endParaRPr lang="en-US" dirty="0"/>
+          </a:p>
+        </p:txBody>
+      </p:sp>
+    </p:spTree>
+    <p:extLst>
+      <p:ext uri="{BB962C8B-B14F-4D97-AF65-F5344CB8AC3E}">
+        <p14:creationId xmlns:p14="http://schemas.microsoft.com/office/powerpoint/2010/main" val="528416514"/>
+      </p:ext>
+    </p:extLst>
+  </p:cSld>
+  <p:clrMapOvr>
+    <a:masterClrMapping/>
+  </p:clrMapOvr>
+</p:sld>
+</file>
+
+<file path=ppt/slides/slide12.xml><?xml version="1.0" encoding="utf-8"?>
+<p:sld xmlns:a="http://schemas.openxmlformats.org/drawingml/2006/main" xmlns:r="http://schemas.openxmlformats.org/officeDocument/2006/relationships" xmlns:p="http://schemas.openxmlformats.org/presentationml/2006/main">
+  <p:cSld>
+    <p:spTree>
+      <p:nvGrpSpPr>
+        <p:cNvPr id="1" name=""/>
+        <p:cNvGrpSpPr/>
+        <p:nvPr/>
+      </p:nvGrpSpPr>
+      <p:grpSpPr>
+        <a:xfrm>
+          <a:off x="0" y="0"/>
+          <a:ext cx="0" cy="0"/>
+          <a:chOff x="0" y="0"/>
+          <a:chExt cx="0" cy="0"/>
+        </a:xfrm>
+      </p:grpSpPr>
+      <p:sp>
+        <p:nvSpPr>
+          <p:cNvPr id="2" name="Text Placeholder 1"/>
+          <p:cNvSpPr>
+            <a:spLocks noGrp="1"/>
+          </p:cNvSpPr>
+          <p:nvPr>
+            <p:ph type="body" sz="quarter" idx="10"/>
+          </p:nvPr>
+        </p:nvSpPr>
+        <p:spPr/>
+        <p:txBody>
+          <a:bodyPr/>
+          <a:lstStyle/>
+          <a:p>
+            <a:r>
+              <a:rPr lang="en-US" dirty="0"/>
+              <a:t>Exercises for Wednesday</a:t>
+            </a:r>
+          </a:p>
+        </p:txBody>
+      </p:sp>
+      <p:sp>
+        <p:nvSpPr>
+          <p:cNvPr id="3" name="Text Placeholder 2"/>
+          <p:cNvSpPr>
+            <a:spLocks noGrp="1"/>
+          </p:cNvSpPr>
+          <p:nvPr>
+            <p:ph type="body" sz="quarter" idx="11"/>
+          </p:nvPr>
+        </p:nvSpPr>
+        <p:spPr/>
+        <p:txBody>
+          <a:bodyPr/>
+          <a:lstStyle/>
+          <a:p>
+            <a:pPr marL="0" lvl="0" indent="0" defTabSz="914400">
+              <a:spcBef>
+                <a:spcPts val="0"/>
+              </a:spcBef>
+              <a:buClrTx/>
+              <a:buNone/>
+            </a:pPr>
+            <a:r>
+              <a:rPr lang="en-US" dirty="0" smtClean="0"/>
+              <a:t>We </a:t>
+            </a:r>
+            <a:r>
+              <a:rPr lang="en-US" dirty="0"/>
+              <a:t>will start </a:t>
+            </a:r>
+            <a:r>
+              <a:rPr lang="en-US" dirty="0" smtClean="0"/>
+              <a:t>Wednesday by </a:t>
+            </a:r>
+            <a:r>
+              <a:rPr lang="en-US" dirty="0"/>
+              <a:t>taking a look at exercise 9</a:t>
+            </a:r>
+          </a:p>
+          <a:p>
+            <a:pPr marL="0" marR="0" lvl="0" indent="0" defTabSz="914400" eaLnBrk="1" fontAlgn="auto" latinLnBrk="0" hangingPunct="1">
+              <a:lnSpc>
+                <a:spcPct val="100000"/>
+              </a:lnSpc>
+              <a:spcBef>
+                <a:spcPts val="0"/>
+              </a:spcBef>
+              <a:spcAft>
+                <a:spcPts val="0"/>
+              </a:spcAft>
+              <a:buClrTx/>
+              <a:buSzTx/>
+              <a:buFontTx/>
+              <a:buNone/>
+              <a:tabLst/>
+              <a:defRPr/>
+            </a:pPr>
+            <a:endParaRPr lang="en-US" dirty="0"/>
+          </a:p>
+        </p:txBody>
+      </p:sp>
+    </p:spTree>
+    <p:extLst>
+      <p:ext uri="{BB962C8B-B14F-4D97-AF65-F5344CB8AC3E}">
+        <p14:creationId xmlns:p14="http://schemas.microsoft.com/office/powerpoint/2010/main" val="1771525920"/>
+      </p:ext>
+    </p:extLst>
+  </p:cSld>
+  <p:clrMapOvr>
+    <a:masterClrMapping/>
+  </p:clrMapOvr>
+  <p:timing>
+    <p:tnLst>
+      <p:par>
+        <p:cTn id="1" dur="indefinite" restart="never" nodeType="tmRoot"/>
+      </p:par>
+    </p:tnLst>
+  </p:timing>
+</p:sld>
+</file>
+
 <file path=ppt/slides/slide2.xml><?xml version="1.0" encoding="utf-8"?>
 <p:sld xmlns:a="http://schemas.openxmlformats.org/drawingml/2006/main" xmlns:r="http://schemas.openxmlformats.org/officeDocument/2006/relationships" xmlns:p="http://schemas.openxmlformats.org/presentationml/2006/main">
   <p:cSld>
@@ -1666,19 +2197,7 @@
               <a:rPr lang="en-US" sz="1600" dirty="0">
                 <a:hlinkClick r:id="rId2"/>
               </a:rPr>
-              <a:t>http://</a:t>
-            </a:r>
-            <a:r>
-              <a:rPr lang="en-US" sz="1600" dirty="0" err="1">
-                <a:hlinkClick r:id="rId2"/>
-              </a:rPr>
-              <a:t>blakesmith.me</a:t>
-            </a:r>
-            <a:r>
-              <a:rPr lang="en-US" sz="1600" dirty="0">
-                <a:hlinkClick r:id="rId2"/>
-              </a:rPr>
-              <a:t>/2010/02/08/understanding-public-key-private-key-</a:t>
+              <a:t>http://blakesmith.me/2010/02/08/understanding-public-key-private-key-</a:t>
             </a:r>
             <a:r>
               <a:rPr lang="en-US" sz="1600" dirty="0" err="1">
@@ -2002,11 +2521,7 @@
             </a:r>
             <a:r>
               <a:rPr lang="en-US" sz="2000" dirty="0" smtClean="0"/>
-              <a:t> </a:t>
-            </a:r>
-            <a:r>
-              <a:rPr lang="en-US" sz="2000" dirty="0" smtClean="0"/>
-              <a:t>computer</a:t>
+              <a:t> computer</a:t>
             </a:r>
           </a:p>
           <a:p>
@@ -2057,7 +2572,6 @@
               <a:rPr lang="en-US" sz="2000" dirty="0" smtClean="0"/>
               <a:t> computer </a:t>
             </a:r>
-            <a:endParaRPr lang="en-US" sz="2000" dirty="0" smtClean="0"/>
           </a:p>
           <a:p>
             <a:pPr lvl="1"/>
@@ -3228,11 +3742,7 @@
             </a:pPr>
             <a:r>
               <a:rPr lang="en-US" dirty="0" smtClean="0"/>
-              <a:t>A </a:t>
-            </a:r>
-            <a:r>
-              <a:rPr lang="en-US" dirty="0" smtClean="0"/>
-              <a:t>message encrypted using private can be decrypted by public key</a:t>
+              <a:t>A message encrypted using private can be decrypted by public key</a:t>
             </a:r>
           </a:p>
           <a:p>
@@ -3270,11 +3780,7 @@
             </a:r>
             <a:r>
               <a:rPr lang="en-US" smtClean="0"/>
-              <a:t>other</a:t>
-            </a:r>
-            <a:r>
-              <a:rPr lang="en-US" smtClean="0"/>
-              <a:t>.</a:t>
+              <a:t>other.</a:t>
             </a:r>
             <a:endParaRPr lang="en-US" dirty="0"/>
           </a:p>
@@ -3518,83 +4024,6 @@
               <a:buClrTx/>
               <a:buNone/>
             </a:pPr>
-            <a:endParaRPr lang="en-US" sz="2400" dirty="0" smtClean="0"/>
-          </a:p>
-          <a:p>
-            <a:pPr marL="0" lvl="0" indent="0" defTabSz="914400">
-              <a:spcBef>
-                <a:spcPts val="0"/>
-              </a:spcBef>
-              <a:buClrTx/>
-              <a:buNone/>
-            </a:pPr>
-            <a:r>
-              <a:rPr lang="en-US" sz="2400" dirty="0" smtClean="0"/>
-              <a:t>Exercise for </a:t>
-            </a:r>
-            <a:r>
-              <a:rPr lang="en-US" sz="2400" dirty="0" smtClean="0"/>
-              <a:t>Thursday:</a:t>
-            </a:r>
-            <a:endParaRPr lang="en-US" sz="2400" dirty="0" smtClean="0"/>
-          </a:p>
-          <a:p>
-            <a:pPr marL="0" lvl="0" indent="0" defTabSz="914400">
-              <a:spcBef>
-                <a:spcPts val="0"/>
-              </a:spcBef>
-              <a:buClrTx/>
-              <a:buNone/>
-            </a:pPr>
-            <a:r>
-              <a:rPr lang="en-US" sz="2400" dirty="0" smtClean="0"/>
-              <a:t>Prepare a sequence diagram showing what communication takes place between the local machine and the machine on digital ocean when establishing a </a:t>
-            </a:r>
-            <a:r>
-              <a:rPr lang="en-US" sz="2400" dirty="0" err="1" smtClean="0"/>
-              <a:t>ssh</a:t>
-            </a:r>
-            <a:r>
-              <a:rPr lang="en-US" sz="2400" dirty="0" smtClean="0"/>
-              <a:t> connection.</a:t>
-            </a:r>
-          </a:p>
-          <a:p>
-            <a:pPr marL="0" lvl="0" indent="0" defTabSz="914400">
-              <a:spcBef>
-                <a:spcPts val="0"/>
-              </a:spcBef>
-              <a:buClrTx/>
-              <a:buNone/>
-            </a:pPr>
-            <a:endParaRPr lang="en-US" sz="2400" dirty="0"/>
-          </a:p>
-          <a:p>
-            <a:pPr marL="0" lvl="0" indent="0" defTabSz="914400">
-              <a:spcBef>
-                <a:spcPts val="0"/>
-              </a:spcBef>
-              <a:buClrTx/>
-              <a:buNone/>
-            </a:pPr>
-            <a:r>
-              <a:rPr lang="en-US" sz="2400" dirty="0" smtClean="0"/>
-              <a:t>The diagram can be on </a:t>
-            </a:r>
-            <a:r>
-              <a:rPr lang="en-US" sz="2400" dirty="0"/>
-              <a:t>a slide, on paper – just something outside of your </a:t>
-            </a:r>
-            <a:r>
-              <a:rPr lang="en-US" sz="2400" dirty="0" smtClean="0"/>
-              <a:t>head </a:t>
-            </a:r>
-            <a:r>
-              <a:rPr lang="en-US" sz="2400" dirty="0" smtClean="0">
-                <a:sym typeface="Wingdings"/>
-              </a:rPr>
-              <a:t></a:t>
-            </a:r>
             <a:endParaRPr lang="en-US" sz="2400" dirty="0"/>
           </a:p>
         </p:txBody>
@@ -3609,6 +4038,13 @@
   <p:clrMapOvr>
     <a:masterClrMapping/>
   </p:clrMapOvr>
+  <p:timing>
+    <p:tnLst>
+      <p:par>
+        <p:cTn id="1" dur="indefinite" restart="never" nodeType="tmRoot"/>
+      </p:par>
+    </p:tnLst>
+  </p:timing>
 </p:sld>
 </file>
 

</xml_diff>

<commit_message>
Added Bclass branch and their stuff
</commit_message>
<xml_diff>
--- a/slides/Day_2.pptx
+++ b/slides/Day_2.pptx
@@ -13,10 +13,6 @@
     <p:sldId id="270" r:id="rId7"/>
     <p:sldId id="271" r:id="rId8"/>
     <p:sldId id="267" r:id="rId9"/>
-    <p:sldId id="266" r:id="rId10"/>
-    <p:sldId id="273" r:id="rId11"/>
-    <p:sldId id="274" r:id="rId12"/>
-    <p:sldId id="272" r:id="rId13"/>
   </p:sldIdLst>
   <p:sldSz cx="9939338" cy="7451725"/>
   <p:notesSz cx="6858000" cy="9144000"/>
@@ -117,7 +113,7 @@
   </p:defaultTextStyle>
   <p:extLst>
     <p:ext uri="{EFAFB233-063F-42B5-8137-9DF3F51BA10A}">
-      <p15:sldGuideLst xmlns:p15="http://schemas.microsoft.com/office/powerpoint/2012/main">
+      <p15:sldGuideLst xmlns:p15="http://schemas.microsoft.com/office/powerpoint/2012/main" xmlns="">
         <p15:guide id="1" orient="horz" pos="2347">
           <p15:clr>
             <a:srgbClr val="A4A3A4"/>
@@ -1278,7 +1274,7 @@
           <a:p>
             <a:r>
               <a:rPr lang="da-DK" dirty="0" smtClean="0"/>
-              <a:t>SSH</a:t>
+              <a:t>Day 2: SSH</a:t>
             </a:r>
             <a:endParaRPr lang="en-US" dirty="0"/>
           </a:p>
@@ -1590,534 +1586,6 @@
 </p:sld>
 </file>
 
-<file path=ppt/slides/slide10.xml><?xml version="1.0" encoding="utf-8"?>
-<p:sld xmlns:a="http://schemas.openxmlformats.org/drawingml/2006/main" xmlns:r="http://schemas.openxmlformats.org/officeDocument/2006/relationships" xmlns:p="http://schemas.openxmlformats.org/presentationml/2006/main">
-  <p:cSld>
-    <p:spTree>
-      <p:nvGrpSpPr>
-        <p:cNvPr id="1" name=""/>
-        <p:cNvGrpSpPr/>
-        <p:nvPr/>
-      </p:nvGrpSpPr>
-      <p:grpSpPr>
-        <a:xfrm>
-          <a:off x="0" y="0"/>
-          <a:ext cx="0" cy="0"/>
-          <a:chOff x="0" y="0"/>
-          <a:chExt cx="0" cy="0"/>
-        </a:xfrm>
-      </p:grpSpPr>
-      <p:sp>
-        <p:nvSpPr>
-          <p:cNvPr id="2" name="Text Placeholder 1"/>
-          <p:cNvSpPr>
-            <a:spLocks noGrp="1"/>
-          </p:cNvSpPr>
-          <p:nvPr>
-            <p:ph type="body" sz="quarter" idx="10"/>
-          </p:nvPr>
-        </p:nvSpPr>
-        <p:spPr/>
-        <p:txBody>
-          <a:bodyPr/>
-          <a:lstStyle/>
-          <a:p>
-            <a:r>
-              <a:rPr lang="en-US" dirty="0" smtClean="0"/>
-              <a:t>Special directory “names”</a:t>
-            </a:r>
-            <a:endParaRPr lang="en-US" dirty="0"/>
-          </a:p>
-        </p:txBody>
-      </p:sp>
-      <p:sp>
-        <p:nvSpPr>
-          <p:cNvPr id="3" name="Text Placeholder 2"/>
-          <p:cNvSpPr>
-            <a:spLocks noGrp="1"/>
-          </p:cNvSpPr>
-          <p:nvPr>
-            <p:ph type="body" sz="quarter" idx="11"/>
-          </p:nvPr>
-        </p:nvSpPr>
-        <p:spPr/>
-        <p:txBody>
-          <a:bodyPr/>
-          <a:lstStyle/>
-          <a:p>
-            <a:r>
-              <a:rPr lang="en-US" dirty="0" smtClean="0"/>
-              <a:t>If you are logged in as user </a:t>
-            </a:r>
-            <a:r>
-              <a:rPr lang="en-US" dirty="0" err="1" smtClean="0"/>
-              <a:t>ralf</a:t>
-            </a:r>
-            <a:r>
-              <a:rPr lang="en-US" dirty="0" smtClean="0"/>
-              <a:t>, </a:t>
-            </a:r>
-          </a:p>
-          <a:p>
-            <a:pPr marL="496885" lvl="1" indent="0">
-              <a:buNone/>
-            </a:pPr>
-            <a:r>
-              <a:rPr lang="da-DK" dirty="0" smtClean="0"/>
-              <a:t>~ is short for /</a:t>
-            </a:r>
-            <a:r>
-              <a:rPr lang="da-DK" dirty="0" err="1" smtClean="0"/>
-              <a:t>home</a:t>
-            </a:r>
-            <a:r>
-              <a:rPr lang="da-DK" dirty="0" smtClean="0"/>
-              <a:t>/</a:t>
-            </a:r>
-            <a:r>
-              <a:rPr lang="da-DK" dirty="0" err="1" smtClean="0"/>
-              <a:t>ralf</a:t>
-            </a:r>
-            <a:endParaRPr lang="da-DK" dirty="0" smtClean="0"/>
-          </a:p>
-          <a:p>
-            <a:r>
-              <a:rPr lang="da-DK" dirty="0" smtClean="0"/>
-              <a:t>~</a:t>
-            </a:r>
-            <a:r>
-              <a:rPr lang="da-DK" dirty="0" err="1" smtClean="0"/>
-              <a:t>joe</a:t>
-            </a:r>
-            <a:r>
-              <a:rPr lang="da-DK" dirty="0" smtClean="0"/>
-              <a:t> is short for /</a:t>
-            </a:r>
-            <a:r>
-              <a:rPr lang="da-DK" dirty="0" err="1" smtClean="0"/>
-              <a:t>home</a:t>
-            </a:r>
-            <a:r>
-              <a:rPr lang="da-DK" dirty="0" smtClean="0"/>
-              <a:t>/</a:t>
-            </a:r>
-            <a:r>
-              <a:rPr lang="da-DK" dirty="0" err="1" smtClean="0"/>
-              <a:t>joe</a:t>
-            </a:r>
-            <a:endParaRPr lang="da-DK" dirty="0" smtClean="0"/>
-          </a:p>
-          <a:p>
-            <a:r>
-              <a:rPr lang="da-DK" dirty="0" smtClean="0"/>
-              <a:t>.. is short for the folder </a:t>
-            </a:r>
-            <a:r>
-              <a:rPr lang="da-DK" dirty="0" err="1" smtClean="0"/>
-              <a:t>above</a:t>
-            </a:r>
-            <a:r>
-              <a:rPr lang="da-DK" dirty="0" smtClean="0"/>
-              <a:t> </a:t>
-            </a:r>
-            <a:r>
-              <a:rPr lang="da-DK" dirty="0" err="1" smtClean="0"/>
-              <a:t>current</a:t>
-            </a:r>
-            <a:r>
-              <a:rPr lang="da-DK" dirty="0" smtClean="0"/>
-              <a:t> </a:t>
-            </a:r>
-            <a:r>
-              <a:rPr lang="da-DK" dirty="0" err="1" smtClean="0"/>
-              <a:t>directory</a:t>
-            </a:r>
-            <a:endParaRPr lang="en-US" dirty="0" smtClean="0"/>
-          </a:p>
-          <a:p>
-            <a:r>
-              <a:rPr lang="en-US" dirty="0" smtClean="0"/>
-              <a:t>. is the current directory</a:t>
-            </a:r>
-          </a:p>
-          <a:p>
-            <a:endParaRPr lang="en-US" dirty="0"/>
-          </a:p>
-          <a:p>
-            <a:r>
-              <a:rPr lang="en-US" dirty="0" smtClean="0"/>
-              <a:t>If a filename (or directory name) starts with . it is not shown by ls.</a:t>
-            </a:r>
-          </a:p>
-          <a:p>
-            <a:r>
-              <a:rPr lang="en-US" dirty="0" smtClean="0"/>
-              <a:t>To see files starting with </a:t>
-            </a:r>
-            <a:r>
-              <a:rPr lang="da-DK" dirty="0" smtClean="0"/>
-              <a:t>. </a:t>
-            </a:r>
-            <a:r>
-              <a:rPr lang="da-DK" dirty="0" err="1" smtClean="0"/>
-              <a:t>use</a:t>
-            </a:r>
-            <a:r>
-              <a:rPr lang="da-DK" dirty="0" smtClean="0"/>
-              <a:t> the </a:t>
-            </a:r>
-            <a:r>
-              <a:rPr lang="mr-IN" dirty="0" smtClean="0"/>
-              <a:t>–</a:t>
-            </a:r>
-            <a:r>
-              <a:rPr lang="da-DK" dirty="0" smtClean="0"/>
-              <a:t>a switch </a:t>
-            </a:r>
-          </a:p>
-        </p:txBody>
-      </p:sp>
-    </p:spTree>
-    <p:extLst>
-      <p:ext uri="{BB962C8B-B14F-4D97-AF65-F5344CB8AC3E}">
-        <p14:creationId xmlns:p14="http://schemas.microsoft.com/office/powerpoint/2010/main" val="528916030"/>
-      </p:ext>
-    </p:extLst>
-  </p:cSld>
-  <p:clrMapOvr>
-    <a:masterClrMapping/>
-  </p:clrMapOvr>
-  <p:timing>
-    <p:tnLst>
-      <p:par>
-        <p:cTn id="1" dur="indefinite" restart="never" nodeType="tmRoot"/>
-      </p:par>
-    </p:tnLst>
-  </p:timing>
-</p:sld>
-</file>
-
-<file path=ppt/slides/slide11.xml><?xml version="1.0" encoding="utf-8"?>
-<p:sld xmlns:a="http://schemas.openxmlformats.org/drawingml/2006/main" xmlns:r="http://schemas.openxmlformats.org/officeDocument/2006/relationships" xmlns:p="http://schemas.openxmlformats.org/presentationml/2006/main">
-  <p:cSld>
-    <p:spTree>
-      <p:nvGrpSpPr>
-        <p:cNvPr id="1" name=""/>
-        <p:cNvGrpSpPr/>
-        <p:nvPr/>
-      </p:nvGrpSpPr>
-      <p:grpSpPr>
-        <a:xfrm>
-          <a:off x="0" y="0"/>
-          <a:ext cx="0" cy="0"/>
-          <a:chOff x="0" y="0"/>
-          <a:chExt cx="0" cy="0"/>
-        </a:xfrm>
-      </p:grpSpPr>
-      <p:sp>
-        <p:nvSpPr>
-          <p:cNvPr id="2" name="Text Placeholder 1"/>
-          <p:cNvSpPr>
-            <a:spLocks noGrp="1"/>
-          </p:cNvSpPr>
-          <p:nvPr>
-            <p:ph type="body" sz="quarter" idx="10"/>
-          </p:nvPr>
-        </p:nvSpPr>
-        <p:spPr/>
-        <p:txBody>
-          <a:bodyPr/>
-          <a:lstStyle/>
-          <a:p>
-            <a:r>
-              <a:rPr lang="en-US" dirty="0" smtClean="0"/>
-              <a:t>Redirecting output</a:t>
-            </a:r>
-            <a:endParaRPr lang="en-US" dirty="0"/>
-          </a:p>
-        </p:txBody>
-      </p:sp>
-      <p:sp>
-        <p:nvSpPr>
-          <p:cNvPr id="3" name="Text Placeholder 2"/>
-          <p:cNvSpPr>
-            <a:spLocks noGrp="1"/>
-          </p:cNvSpPr>
-          <p:nvPr>
-            <p:ph type="body" sz="quarter" idx="11"/>
-          </p:nvPr>
-        </p:nvSpPr>
-        <p:spPr/>
-        <p:txBody>
-          <a:bodyPr/>
-          <a:lstStyle/>
-          <a:p>
-            <a:r>
-              <a:rPr lang="en-US" dirty="0" smtClean="0"/>
-              <a:t>Many commands produce output to the terminal</a:t>
-            </a:r>
-          </a:p>
-          <a:p>
-            <a:r>
-              <a:rPr lang="en-US" dirty="0" smtClean="0"/>
-              <a:t>This </a:t>
-            </a:r>
-            <a:r>
-              <a:rPr lang="en-US" b="1" dirty="0" smtClean="0"/>
-              <a:t>output can be redirected</a:t>
-            </a:r>
-            <a:endParaRPr lang="en-US" dirty="0" smtClean="0"/>
-          </a:p>
-          <a:p>
-            <a:r>
-              <a:rPr lang="en-US" dirty="0" err="1" smtClean="0"/>
-              <a:t>Eg</a:t>
-            </a:r>
-            <a:r>
-              <a:rPr lang="en-US" dirty="0" smtClean="0"/>
-              <a:t>. ls </a:t>
-            </a:r>
-            <a:r>
-              <a:rPr lang="mr-IN" dirty="0" smtClean="0"/>
-              <a:t>–</a:t>
-            </a:r>
-            <a:r>
-              <a:rPr lang="en-US" dirty="0" smtClean="0"/>
-              <a:t>al &gt; </a:t>
-            </a:r>
-            <a:r>
-              <a:rPr lang="en-US" dirty="0" err="1" smtClean="0"/>
-              <a:t>myfile.txt</a:t>
-            </a:r>
-            <a:endParaRPr lang="en-US" dirty="0" smtClean="0"/>
-          </a:p>
-          <a:p>
-            <a:endParaRPr lang="en-US" dirty="0"/>
-          </a:p>
-          <a:p>
-            <a:r>
-              <a:rPr lang="en-US" dirty="0" smtClean="0"/>
-              <a:t>some files read from the terminal</a:t>
-            </a:r>
-          </a:p>
-          <a:p>
-            <a:r>
-              <a:rPr lang="en-US" dirty="0" smtClean="0"/>
-              <a:t>this </a:t>
-            </a:r>
-            <a:r>
-              <a:rPr lang="en-US" b="1" dirty="0" smtClean="0"/>
-              <a:t>input can be redirected</a:t>
-            </a:r>
-            <a:r>
-              <a:rPr lang="en-US" dirty="0" smtClean="0"/>
-              <a:t> </a:t>
-            </a:r>
-          </a:p>
-          <a:p>
-            <a:r>
-              <a:rPr lang="en-US" dirty="0" err="1" smtClean="0"/>
-              <a:t>Eg</a:t>
-            </a:r>
-            <a:r>
-              <a:rPr lang="en-US" dirty="0" smtClean="0"/>
-              <a:t>. </a:t>
-            </a:r>
-            <a:r>
-              <a:rPr lang="en-US" dirty="0" err="1" smtClean="0"/>
-              <a:t>wc</a:t>
-            </a:r>
-            <a:r>
-              <a:rPr lang="en-US" dirty="0" smtClean="0"/>
-              <a:t> &lt; </a:t>
-            </a:r>
-            <a:r>
-              <a:rPr lang="en-US" dirty="0" err="1" smtClean="0"/>
-              <a:t>myfile</a:t>
-            </a:r>
-            <a:endParaRPr lang="en-US" dirty="0" smtClean="0"/>
-          </a:p>
-          <a:p>
-            <a:endParaRPr lang="en-US" dirty="0"/>
-          </a:p>
-          <a:p>
-            <a:r>
-              <a:rPr lang="en-US" dirty="0" smtClean="0"/>
-              <a:t>output from one command can be given as input to an other </a:t>
-            </a:r>
-            <a:r>
-              <a:rPr lang="mr-IN" dirty="0" smtClean="0"/>
-              <a:t>–</a:t>
-            </a:r>
-            <a:r>
-              <a:rPr lang="en-US" dirty="0" smtClean="0"/>
-              <a:t> this is called “</a:t>
-            </a:r>
-            <a:r>
-              <a:rPr lang="en-US" b="1" dirty="0" smtClean="0"/>
-              <a:t>piping</a:t>
-            </a:r>
-            <a:r>
-              <a:rPr lang="en-US" dirty="0" smtClean="0"/>
-              <a:t>”</a:t>
-            </a:r>
-          </a:p>
-          <a:p>
-            <a:r>
-              <a:rPr lang="en-US" dirty="0" err="1" smtClean="0"/>
-              <a:t>Eg</a:t>
-            </a:r>
-            <a:r>
-              <a:rPr lang="en-US" dirty="0" smtClean="0"/>
-              <a:t>. ls -al | </a:t>
-            </a:r>
-            <a:r>
-              <a:rPr lang="en-US" dirty="0" err="1" smtClean="0"/>
-              <a:t>wc</a:t>
-            </a:r>
-            <a:r>
-              <a:rPr lang="en-US" dirty="0" smtClean="0"/>
-              <a:t> -w</a:t>
-            </a:r>
-          </a:p>
-          <a:p>
-            <a:endParaRPr lang="en-US" dirty="0"/>
-          </a:p>
-        </p:txBody>
-      </p:sp>
-    </p:spTree>
-    <p:extLst>
-      <p:ext uri="{BB962C8B-B14F-4D97-AF65-F5344CB8AC3E}">
-        <p14:creationId xmlns:p14="http://schemas.microsoft.com/office/powerpoint/2010/main" val="528416514"/>
-      </p:ext>
-    </p:extLst>
-  </p:cSld>
-  <p:clrMapOvr>
-    <a:masterClrMapping/>
-  </p:clrMapOvr>
-</p:sld>
-</file>
-
-<file path=ppt/slides/slide12.xml><?xml version="1.0" encoding="utf-8"?>
-<p:sld xmlns:a="http://schemas.openxmlformats.org/drawingml/2006/main" xmlns:r="http://schemas.openxmlformats.org/officeDocument/2006/relationships" xmlns:p="http://schemas.openxmlformats.org/presentationml/2006/main">
-  <p:cSld>
-    <p:spTree>
-      <p:nvGrpSpPr>
-        <p:cNvPr id="1" name=""/>
-        <p:cNvGrpSpPr/>
-        <p:nvPr/>
-      </p:nvGrpSpPr>
-      <p:grpSpPr>
-        <a:xfrm>
-          <a:off x="0" y="0"/>
-          <a:ext cx="0" cy="0"/>
-          <a:chOff x="0" y="0"/>
-          <a:chExt cx="0" cy="0"/>
-        </a:xfrm>
-      </p:grpSpPr>
-      <p:sp>
-        <p:nvSpPr>
-          <p:cNvPr id="2" name="Text Placeholder 1"/>
-          <p:cNvSpPr>
-            <a:spLocks noGrp="1"/>
-          </p:cNvSpPr>
-          <p:nvPr>
-            <p:ph type="body" sz="quarter" idx="10"/>
-          </p:nvPr>
-        </p:nvSpPr>
-        <p:spPr/>
-        <p:txBody>
-          <a:bodyPr/>
-          <a:lstStyle/>
-          <a:p>
-            <a:r>
-              <a:rPr lang="en-US" dirty="0"/>
-              <a:t>Exercises for Wednesday</a:t>
-            </a:r>
-          </a:p>
-        </p:txBody>
-      </p:sp>
-      <p:sp>
-        <p:nvSpPr>
-          <p:cNvPr id="3" name="Text Placeholder 2"/>
-          <p:cNvSpPr>
-            <a:spLocks noGrp="1"/>
-          </p:cNvSpPr>
-          <p:nvPr>
-            <p:ph type="body" sz="quarter" idx="11"/>
-          </p:nvPr>
-        </p:nvSpPr>
-        <p:spPr/>
-        <p:txBody>
-          <a:bodyPr/>
-          <a:lstStyle/>
-          <a:p>
-            <a:pPr marL="0" lvl="0" indent="0" defTabSz="914400">
-              <a:spcBef>
-                <a:spcPts val="0"/>
-              </a:spcBef>
-              <a:buClrTx/>
-              <a:buNone/>
-            </a:pPr>
-            <a:r>
-              <a:rPr lang="en-US" dirty="0" smtClean="0"/>
-              <a:t>We </a:t>
-            </a:r>
-            <a:r>
-              <a:rPr lang="en-US" dirty="0"/>
-              <a:t>will start </a:t>
-            </a:r>
-            <a:r>
-              <a:rPr lang="en-US" dirty="0" smtClean="0"/>
-              <a:t>Wednesday by </a:t>
-            </a:r>
-            <a:r>
-              <a:rPr lang="en-US" dirty="0"/>
-              <a:t>taking a look at exercise 9</a:t>
-            </a:r>
-          </a:p>
-          <a:p>
-            <a:pPr marL="0" marR="0" lvl="0" indent="0" defTabSz="914400" eaLnBrk="1" fontAlgn="auto" latinLnBrk="0" hangingPunct="1">
-              <a:lnSpc>
-                <a:spcPct val="100000"/>
-              </a:lnSpc>
-              <a:spcBef>
-                <a:spcPts val="0"/>
-              </a:spcBef>
-              <a:spcAft>
-                <a:spcPts val="0"/>
-              </a:spcAft>
-              <a:buClrTx/>
-              <a:buSzTx/>
-              <a:buFontTx/>
-              <a:buNone/>
-              <a:tabLst/>
-              <a:defRPr/>
-            </a:pPr>
-            <a:endParaRPr lang="en-US" dirty="0"/>
-          </a:p>
-        </p:txBody>
-      </p:sp>
-    </p:spTree>
-    <p:extLst>
-      <p:ext uri="{BB962C8B-B14F-4D97-AF65-F5344CB8AC3E}">
-        <p14:creationId xmlns:p14="http://schemas.microsoft.com/office/powerpoint/2010/main" val="1771525920"/>
-      </p:ext>
-    </p:extLst>
-  </p:cSld>
-  <p:clrMapOvr>
-    <a:masterClrMapping/>
-  </p:clrMapOvr>
-  <p:timing>
-    <p:tnLst>
-      <p:par>
-        <p:cTn id="1" dur="indefinite" restart="never" nodeType="tmRoot"/>
-      </p:par>
-    </p:tnLst>
-  </p:timing>
-</p:sld>
-</file>
-
 <file path=ppt/slides/slide2.xml><?xml version="1.0" encoding="utf-8"?>
 <p:sld xmlns:a="http://schemas.openxmlformats.org/drawingml/2006/main" xmlns:r="http://schemas.openxmlformats.org/officeDocument/2006/relationships" xmlns:p="http://schemas.openxmlformats.org/presentationml/2006/main">
   <p:cSld>
@@ -2197,7 +1665,19 @@
               <a:rPr lang="en-US" sz="1600" dirty="0">
                 <a:hlinkClick r:id="rId2"/>
               </a:rPr>
-              <a:t>http://blakesmith.me/2010/02/08/understanding-public-key-private-key-</a:t>
+              <a:t>http://</a:t>
+            </a:r>
+            <a:r>
+              <a:rPr lang="en-US" sz="1600" dirty="0" err="1">
+                <a:hlinkClick r:id="rId2"/>
+              </a:rPr>
+              <a:t>blakesmith.me</a:t>
+            </a:r>
+            <a:r>
+              <a:rPr lang="en-US" sz="1600" dirty="0">
+                <a:hlinkClick r:id="rId2"/>
+              </a:rPr>
+              <a:t>/2010/02/08/understanding-public-key-private-key-</a:t>
             </a:r>
             <a:r>
               <a:rPr lang="en-US" sz="1600" dirty="0" err="1">
@@ -3776,11 +3256,7 @@
             </a:pPr>
             <a:r>
               <a:rPr lang="en-US" dirty="0" smtClean="0"/>
-              <a:t>Assume two parties A and B each has their private key, and the public key of the </a:t>
-            </a:r>
-            <a:r>
-              <a:rPr lang="en-US" smtClean="0"/>
-              <a:t>other.</a:t>
+              <a:t>Assume two parties A and B each has their private key, and the public key of the other.</a:t>
             </a:r>
             <a:endParaRPr lang="en-US" dirty="0"/>
           </a:p>
@@ -3810,20 +3286,6 @@
             <a:r>
               <a:rPr lang="en-US" dirty="0" smtClean="0"/>
               <a:t>How can B be sure the message is from A?</a:t>
-            </a:r>
-          </a:p>
-          <a:p>
-            <a:pPr marL="514350" indent="-514350" defTabSz="914400">
-              <a:spcBef>
-                <a:spcPts val="0"/>
-              </a:spcBef>
-              <a:buClrTx/>
-              <a:buFont typeface="+mj-lt"/>
-              <a:buAutoNum type="arabicPeriod"/>
-            </a:pPr>
-            <a:r>
-              <a:rPr lang="en-US" dirty="0" smtClean="0"/>
-              <a:t>(hard) – if B does not have A’s public key, how can B be sure a message is from A</a:t>
             </a:r>
           </a:p>
           <a:p>
@@ -3878,173 +3340,6 @@
   <p:clrMapOvr>
     <a:masterClrMapping/>
   </p:clrMapOvr>
-</p:sld>
-</file>
-
-<file path=ppt/slides/slide9.xml><?xml version="1.0" encoding="utf-8"?>
-<p:sld xmlns:a="http://schemas.openxmlformats.org/drawingml/2006/main" xmlns:r="http://schemas.openxmlformats.org/officeDocument/2006/relationships" xmlns:p="http://schemas.openxmlformats.org/presentationml/2006/main">
-  <p:cSld>
-    <p:spTree>
-      <p:nvGrpSpPr>
-        <p:cNvPr id="1" name=""/>
-        <p:cNvGrpSpPr/>
-        <p:nvPr/>
-      </p:nvGrpSpPr>
-      <p:grpSpPr>
-        <a:xfrm>
-          <a:off x="0" y="0"/>
-          <a:ext cx="0" cy="0"/>
-          <a:chOff x="0" y="0"/>
-          <a:chExt cx="0" cy="0"/>
-        </a:xfrm>
-      </p:grpSpPr>
-      <p:sp>
-        <p:nvSpPr>
-          <p:cNvPr id="2" name="Text Placeholder 1"/>
-          <p:cNvSpPr>
-            <a:spLocks noGrp="1"/>
-          </p:cNvSpPr>
-          <p:nvPr>
-            <p:ph type="body" sz="quarter" idx="10"/>
-          </p:nvPr>
-        </p:nvSpPr>
-        <p:spPr/>
-        <p:txBody>
-          <a:bodyPr/>
-          <a:lstStyle/>
-          <a:p>
-            <a:r>
-              <a:rPr lang="en-US" dirty="0" err="1" smtClean="0"/>
-              <a:t>ssh</a:t>
-            </a:r>
-            <a:endParaRPr lang="en-US" dirty="0"/>
-          </a:p>
-        </p:txBody>
-      </p:sp>
-      <p:sp>
-        <p:nvSpPr>
-          <p:cNvPr id="3" name="Text Placeholder 2"/>
-          <p:cNvSpPr>
-            <a:spLocks noGrp="1"/>
-          </p:cNvSpPr>
-          <p:nvPr>
-            <p:ph type="body" sz="quarter" idx="11"/>
-          </p:nvPr>
-        </p:nvSpPr>
-        <p:spPr/>
-        <p:txBody>
-          <a:bodyPr/>
-          <a:lstStyle/>
-          <a:p>
-            <a:pPr marL="0" marR="0" lvl="0" indent="0" defTabSz="914400" eaLnBrk="1" fontAlgn="auto" latinLnBrk="0" hangingPunct="1">
-              <a:lnSpc>
-                <a:spcPct val="100000"/>
-              </a:lnSpc>
-              <a:spcBef>
-                <a:spcPts val="0"/>
-              </a:spcBef>
-              <a:spcAft>
-                <a:spcPts val="0"/>
-              </a:spcAft>
-              <a:buClrTx/>
-              <a:buSzTx/>
-              <a:buFontTx/>
-              <a:buNone/>
-              <a:tabLst/>
-              <a:defRPr/>
-            </a:pPr>
-            <a:r>
-              <a:rPr lang="en-US" sz="2400" dirty="0" err="1" smtClean="0"/>
-              <a:t>Ressources</a:t>
-            </a:r>
-            <a:r>
-              <a:rPr lang="en-US" sz="2400" dirty="0" smtClean="0"/>
-              <a:t>:</a:t>
-            </a:r>
-          </a:p>
-          <a:p>
-            <a:pPr defTabSz="914400">
-              <a:spcBef>
-                <a:spcPts val="0"/>
-              </a:spcBef>
-              <a:buClrTx/>
-            </a:pPr>
-            <a:r>
-              <a:rPr lang="en-US" sz="1800" dirty="0">
-                <a:hlinkClick r:id="rId2"/>
-              </a:rPr>
-              <a:t>https://</a:t>
-            </a:r>
-            <a:r>
-              <a:rPr lang="en-US" sz="1800" dirty="0" smtClean="0">
-                <a:hlinkClick r:id="rId2"/>
-              </a:rPr>
-              <a:t>www.digitalocean.com/community/tutorials/understanding-the-ssh-encryption-and-connection-process</a:t>
-            </a:r>
-            <a:endParaRPr lang="en-US" sz="1800" dirty="0" smtClean="0"/>
-          </a:p>
-          <a:p>
-            <a:pPr defTabSz="914400">
-              <a:spcBef>
-                <a:spcPts val="0"/>
-              </a:spcBef>
-              <a:buClrTx/>
-            </a:pPr>
-            <a:r>
-              <a:rPr lang="en-US" sz="1800" dirty="0">
-                <a:hlinkClick r:id="rId3"/>
-              </a:rPr>
-              <a:t>https://</a:t>
-            </a:r>
-            <a:r>
-              <a:rPr lang="en-US" sz="1800" dirty="0" err="1">
-                <a:hlinkClick r:id="rId3"/>
-              </a:rPr>
-              <a:t>en.wikipedia.org</a:t>
-            </a:r>
-            <a:r>
-              <a:rPr lang="en-US" sz="1800" dirty="0">
-                <a:hlinkClick r:id="rId3"/>
-              </a:rPr>
-              <a:t>/wiki/Public-</a:t>
-            </a:r>
-            <a:r>
-              <a:rPr lang="en-US" sz="1800" dirty="0" err="1">
-                <a:hlinkClick r:id="rId3"/>
-              </a:rPr>
-              <a:t>key_cryptography</a:t>
-            </a:r>
-            <a:endParaRPr lang="en-US" sz="1800" dirty="0" smtClean="0"/>
-          </a:p>
-          <a:p>
-            <a:pPr marL="0" lvl="0" indent="0" defTabSz="914400">
-              <a:spcBef>
-                <a:spcPts val="0"/>
-              </a:spcBef>
-              <a:buClrTx/>
-              <a:buNone/>
-            </a:pPr>
-            <a:endParaRPr lang="en-US" sz="2400" dirty="0"/>
-          </a:p>
-        </p:txBody>
-      </p:sp>
-    </p:spTree>
-    <p:extLst>
-      <p:ext uri="{BB962C8B-B14F-4D97-AF65-F5344CB8AC3E}">
-        <p14:creationId xmlns:p14="http://schemas.microsoft.com/office/powerpoint/2010/main" val="306100042"/>
-      </p:ext>
-    </p:extLst>
-  </p:cSld>
-  <p:clrMapOvr>
-    <a:masterClrMapping/>
-  </p:clrMapOvr>
-  <p:timing>
-    <p:tnLst>
-      <p:par>
-        <p:cTn id="1" dur="indefinite" restart="never" nodeType="tmRoot"/>
-      </p:par>
-    </p:tnLst>
-  </p:timing>
 </p:sld>
 </file>
 

</xml_diff>